<commit_message>
WIP for interacting with Objects
</commit_message>
<xml_diff>
--- a/Reference Documents/Pitch.pptx
+++ b/Reference Documents/Pitch.pptx
@@ -10,9 +10,10 @@
     <p:sldId id="258" r:id="rId4"/>
     <p:sldId id="259" r:id="rId5"/>
     <p:sldId id="260" r:id="rId6"/>
-    <p:sldId id="261" r:id="rId7"/>
-    <p:sldId id="262" r:id="rId8"/>
-    <p:sldId id="263" r:id="rId9"/>
+    <p:sldId id="264" r:id="rId7"/>
+    <p:sldId id="261" r:id="rId8"/>
+    <p:sldId id="262" r:id="rId9"/>
+    <p:sldId id="263" r:id="rId10"/>
   </p:sldIdLst>
   <p:sldSz cx="12192000" cy="6858000"/>
   <p:notesSz cx="6858000" cy="9144000"/>
@@ -122,7 +123,7 @@
 <file path=ppt/revisionInfo.xml><?xml version="1.0" encoding="utf-8"?>
 <p1510:revInfo xmlns:a="http://schemas.openxmlformats.org/drawingml/2006/main" xmlns:r="http://schemas.openxmlformats.org/officeDocument/2006/relationships" xmlns:p1510="http://schemas.microsoft.com/office/powerpoint/2015/10/main">
   <p1510:revLst>
-    <p1510:client id="{8B7AB1EC-9DFE-49F4-ABA1-52FD3DD0B185}" v="16" dt="2021-01-29T18:43:21.590"/>
+    <p1510:client id="{8B7AB1EC-9DFE-49F4-ABA1-52FD3DD0B185}" v="17" dt="2021-01-29T20:45:24.640"/>
   </p1510:revLst>
 </p1510:revInfo>
 </file>
@@ -131,8 +132,8 @@
 <pc:chgInfo xmlns:a="http://schemas.openxmlformats.org/drawingml/2006/main" xmlns:r="http://schemas.openxmlformats.org/officeDocument/2006/relationships" xmlns:ac="http://schemas.microsoft.com/office/drawing/2013/main/command" xmlns:pc="http://schemas.microsoft.com/office/powerpoint/2013/main/command">
   <pc:docChgLst>
     <pc:chgData name="Vince McKeown" userId="31f1b572cc8f689e" providerId="LiveId" clId="{8B7AB1EC-9DFE-49F4-ABA1-52FD3DD0B185}"/>
-    <pc:docChg chg="custSel delSld modSld">
-      <pc:chgData name="Vince McKeown" userId="31f1b572cc8f689e" providerId="LiveId" clId="{8B7AB1EC-9DFE-49F4-ABA1-52FD3DD0B185}" dt="2021-01-29T18:57:36.298" v="355" actId="47"/>
+    <pc:docChg chg="undo custSel addSld delSld modSld">
+      <pc:chgData name="Vince McKeown" userId="31f1b572cc8f689e" providerId="LiveId" clId="{8B7AB1EC-9DFE-49F4-ABA1-52FD3DD0B185}" dt="2021-01-29T20:45:45.572" v="401" actId="12"/>
       <pc:docMkLst>
         <pc:docMk/>
       </pc:docMkLst>
@@ -262,11 +263,27 @@
         </pc:picChg>
       </pc:sldChg>
       <pc:sldChg chg="addSp delSp modSp mod">
-        <pc:chgData name="Vince McKeown" userId="31f1b572cc8f689e" providerId="LiveId" clId="{8B7AB1EC-9DFE-49F4-ABA1-52FD3DD0B185}" dt="2021-01-29T17:00:13.704" v="185" actId="14100"/>
+        <pc:chgData name="Vince McKeown" userId="31f1b572cc8f689e" providerId="LiveId" clId="{8B7AB1EC-9DFE-49F4-ABA1-52FD3DD0B185}" dt="2021-01-29T20:45:45.572" v="401" actId="12"/>
         <pc:sldMkLst>
           <pc:docMk/>
           <pc:sldMk cId="1010719961" sldId="260"/>
         </pc:sldMkLst>
+        <pc:spChg chg="mod">
+          <ac:chgData name="Vince McKeown" userId="31f1b572cc8f689e" providerId="LiveId" clId="{8B7AB1EC-9DFE-49F4-ABA1-52FD3DD0B185}" dt="2021-01-29T20:45:15.450" v="360" actId="1076"/>
+          <ac:spMkLst>
+            <pc:docMk/>
+            <pc:sldMk cId="1010719961" sldId="260"/>
+            <ac:spMk id="2" creationId="{00000000-0000-0000-0000-000000000000}"/>
+          </ac:spMkLst>
+        </pc:spChg>
+        <pc:spChg chg="add mod">
+          <ac:chgData name="Vince McKeown" userId="31f1b572cc8f689e" providerId="LiveId" clId="{8B7AB1EC-9DFE-49F4-ABA1-52FD3DD0B185}" dt="2021-01-29T20:45:45.572" v="401" actId="12"/>
+          <ac:spMkLst>
+            <pc:docMk/>
+            <pc:sldMk cId="1010719961" sldId="260"/>
+            <ac:spMk id="3" creationId="{070E6662-9C59-433B-B0BA-F4FEDB67C197}"/>
+          </ac:spMkLst>
+        </pc:spChg>
         <pc:spChg chg="del mod">
           <ac:chgData name="Vince McKeown" userId="31f1b572cc8f689e" providerId="LiveId" clId="{8B7AB1EC-9DFE-49F4-ABA1-52FD3DD0B185}" dt="2021-01-29T16:54:18.312" v="80" actId="478"/>
           <ac:spMkLst>
@@ -283,16 +300,16 @@
             <ac:spMk id="5" creationId="{2285A2AE-936B-441E-A320-112EB89A90A1}"/>
           </ac:spMkLst>
         </pc:spChg>
-        <pc:spChg chg="add mod">
-          <ac:chgData name="Vince McKeown" userId="31f1b572cc8f689e" providerId="LiveId" clId="{8B7AB1EC-9DFE-49F4-ABA1-52FD3DD0B185}" dt="2021-01-29T16:56:20.237" v="98" actId="122"/>
+        <pc:spChg chg="add del mod">
+          <ac:chgData name="Vince McKeown" userId="31f1b572cc8f689e" providerId="LiveId" clId="{8B7AB1EC-9DFE-49F4-ABA1-52FD3DD0B185}" dt="2021-01-29T20:45:10.974" v="358" actId="478"/>
           <ac:spMkLst>
             <pc:docMk/>
             <pc:sldMk cId="1010719961" sldId="260"/>
             <ac:spMk id="7" creationId="{452C26FB-B953-4C73-B5D3-8F10655C4A4B}"/>
           </ac:spMkLst>
         </pc:spChg>
-        <pc:spChg chg="add mod">
-          <ac:chgData name="Vince McKeown" userId="31f1b572cc8f689e" providerId="LiveId" clId="{8B7AB1EC-9DFE-49F4-ABA1-52FD3DD0B185}" dt="2021-01-29T16:59:09.423" v="176" actId="1035"/>
+        <pc:spChg chg="add del mod">
+          <ac:chgData name="Vince McKeown" userId="31f1b572cc8f689e" providerId="LiveId" clId="{8B7AB1EC-9DFE-49F4-ABA1-52FD3DD0B185}" dt="2021-01-29T20:45:21.470" v="361" actId="478"/>
           <ac:spMkLst>
             <pc:docMk/>
             <pc:sldMk cId="1010719961" sldId="260"/>
@@ -307,96 +324,96 @@
             <ac:spMk id="9" creationId="{A66F53F8-6F61-4974-822F-B4C33D76ED19}"/>
           </ac:spMkLst>
         </pc:spChg>
-        <pc:spChg chg="add mod">
-          <ac:chgData name="Vince McKeown" userId="31f1b572cc8f689e" providerId="LiveId" clId="{8B7AB1EC-9DFE-49F4-ABA1-52FD3DD0B185}" dt="2021-01-29T16:59:09.423" v="176" actId="1035"/>
+        <pc:spChg chg="add del mod">
+          <ac:chgData name="Vince McKeown" userId="31f1b572cc8f689e" providerId="LiveId" clId="{8B7AB1EC-9DFE-49F4-ABA1-52FD3DD0B185}" dt="2021-01-29T20:45:21.470" v="361" actId="478"/>
           <ac:spMkLst>
             <pc:docMk/>
             <pc:sldMk cId="1010719961" sldId="260"/>
             <ac:spMk id="12" creationId="{793E7E51-BC37-4408-AE81-C27C93D88939}"/>
           </ac:spMkLst>
         </pc:spChg>
-        <pc:spChg chg="add mod">
-          <ac:chgData name="Vince McKeown" userId="31f1b572cc8f689e" providerId="LiveId" clId="{8B7AB1EC-9DFE-49F4-ABA1-52FD3DD0B185}" dt="2021-01-29T16:59:09.423" v="176" actId="1035"/>
+        <pc:spChg chg="add del mod">
+          <ac:chgData name="Vince McKeown" userId="31f1b572cc8f689e" providerId="LiveId" clId="{8B7AB1EC-9DFE-49F4-ABA1-52FD3DD0B185}" dt="2021-01-29T20:45:21.470" v="361" actId="478"/>
           <ac:spMkLst>
             <pc:docMk/>
             <pc:sldMk cId="1010719961" sldId="260"/>
             <ac:spMk id="13" creationId="{4ED3B728-6F0E-4D93-86F7-BAAAAC43BDEE}"/>
           </ac:spMkLst>
         </pc:spChg>
-        <pc:spChg chg="add mod">
-          <ac:chgData name="Vince McKeown" userId="31f1b572cc8f689e" providerId="LiveId" clId="{8B7AB1EC-9DFE-49F4-ABA1-52FD3DD0B185}" dt="2021-01-29T16:59:09.423" v="176" actId="1035"/>
+        <pc:spChg chg="add del mod">
+          <ac:chgData name="Vince McKeown" userId="31f1b572cc8f689e" providerId="LiveId" clId="{8B7AB1EC-9DFE-49F4-ABA1-52FD3DD0B185}" dt="2021-01-29T20:45:21.470" v="361" actId="478"/>
           <ac:spMkLst>
             <pc:docMk/>
             <pc:sldMk cId="1010719961" sldId="260"/>
             <ac:spMk id="14" creationId="{2689C65E-7058-4D51-AF10-800FD879ED39}"/>
           </ac:spMkLst>
         </pc:spChg>
-        <pc:spChg chg="add mod">
-          <ac:chgData name="Vince McKeown" userId="31f1b572cc8f689e" providerId="LiveId" clId="{8B7AB1EC-9DFE-49F4-ABA1-52FD3DD0B185}" dt="2021-01-29T16:59:09.423" v="176" actId="1035"/>
+        <pc:spChg chg="add del mod">
+          <ac:chgData name="Vince McKeown" userId="31f1b572cc8f689e" providerId="LiveId" clId="{8B7AB1EC-9DFE-49F4-ABA1-52FD3DD0B185}" dt="2021-01-29T20:45:21.470" v="361" actId="478"/>
           <ac:spMkLst>
             <pc:docMk/>
             <pc:sldMk cId="1010719961" sldId="260"/>
             <ac:spMk id="15" creationId="{FF604C26-E5AB-4156-824D-F737E4C8CCC5}"/>
           </ac:spMkLst>
         </pc:spChg>
-        <pc:spChg chg="add mod">
-          <ac:chgData name="Vince McKeown" userId="31f1b572cc8f689e" providerId="LiveId" clId="{8B7AB1EC-9DFE-49F4-ABA1-52FD3DD0B185}" dt="2021-01-29T16:59:09.423" v="176" actId="1035"/>
+        <pc:spChg chg="add del mod">
+          <ac:chgData name="Vince McKeown" userId="31f1b572cc8f689e" providerId="LiveId" clId="{8B7AB1EC-9DFE-49F4-ABA1-52FD3DD0B185}" dt="2021-01-29T20:45:21.470" v="361" actId="478"/>
           <ac:spMkLst>
             <pc:docMk/>
             <pc:sldMk cId="1010719961" sldId="260"/>
             <ac:spMk id="16" creationId="{1B5B0A3E-CA52-478F-AF43-234F89BBB78E}"/>
           </ac:spMkLst>
         </pc:spChg>
-        <pc:spChg chg="add mod">
-          <ac:chgData name="Vince McKeown" userId="31f1b572cc8f689e" providerId="LiveId" clId="{8B7AB1EC-9DFE-49F4-ABA1-52FD3DD0B185}" dt="2021-01-29T16:59:01.023" v="155" actId="1076"/>
+        <pc:spChg chg="add del mod">
+          <ac:chgData name="Vince McKeown" userId="31f1b572cc8f689e" providerId="LiveId" clId="{8B7AB1EC-9DFE-49F4-ABA1-52FD3DD0B185}" dt="2021-01-29T20:45:21.470" v="361" actId="478"/>
           <ac:spMkLst>
             <pc:docMk/>
             <pc:sldMk cId="1010719961" sldId="260"/>
             <ac:spMk id="17" creationId="{53052C51-D451-4860-A2E3-4BD866D53D28}"/>
           </ac:spMkLst>
         </pc:spChg>
-        <pc:spChg chg="add mod">
-          <ac:chgData name="Vince McKeown" userId="31f1b572cc8f689e" providerId="LiveId" clId="{8B7AB1EC-9DFE-49F4-ABA1-52FD3DD0B185}" dt="2021-01-29T16:59:23.099" v="179" actId="20577"/>
+        <pc:spChg chg="add del mod">
+          <ac:chgData name="Vince McKeown" userId="31f1b572cc8f689e" providerId="LiveId" clId="{8B7AB1EC-9DFE-49F4-ABA1-52FD3DD0B185}" dt="2021-01-29T20:45:21.470" v="361" actId="478"/>
           <ac:spMkLst>
             <pc:docMk/>
             <pc:sldMk cId="1010719961" sldId="260"/>
             <ac:spMk id="18" creationId="{0456882E-3070-42E0-B8DC-67561F6F31E9}"/>
           </ac:spMkLst>
         </pc:spChg>
-        <pc:spChg chg="add">
-          <ac:chgData name="Vince McKeown" userId="31f1b572cc8f689e" providerId="LiveId" clId="{8B7AB1EC-9DFE-49F4-ABA1-52FD3DD0B185}" dt="2021-01-29T16:59:37.353" v="180" actId="11529"/>
+        <pc:spChg chg="add del">
+          <ac:chgData name="Vince McKeown" userId="31f1b572cc8f689e" providerId="LiveId" clId="{8B7AB1EC-9DFE-49F4-ABA1-52FD3DD0B185}" dt="2021-01-29T20:45:21.470" v="361" actId="478"/>
           <ac:spMkLst>
             <pc:docMk/>
             <pc:sldMk cId="1010719961" sldId="260"/>
             <ac:spMk id="19" creationId="{B5BE306C-F376-4015-A9B6-7B917DF7AE62}"/>
           </ac:spMkLst>
         </pc:spChg>
-        <pc:spChg chg="add">
-          <ac:chgData name="Vince McKeown" userId="31f1b572cc8f689e" providerId="LiveId" clId="{8B7AB1EC-9DFE-49F4-ABA1-52FD3DD0B185}" dt="2021-01-29T16:59:46.445" v="181" actId="11529"/>
+        <pc:spChg chg="add del">
+          <ac:chgData name="Vince McKeown" userId="31f1b572cc8f689e" providerId="LiveId" clId="{8B7AB1EC-9DFE-49F4-ABA1-52FD3DD0B185}" dt="2021-01-29T20:45:21.470" v="361" actId="478"/>
           <ac:spMkLst>
             <pc:docMk/>
             <pc:sldMk cId="1010719961" sldId="260"/>
             <ac:spMk id="20" creationId="{4C013E77-0EBB-4155-8ABA-D42323C0771B}"/>
           </ac:spMkLst>
         </pc:spChg>
-        <pc:spChg chg="add">
-          <ac:chgData name="Vince McKeown" userId="31f1b572cc8f689e" providerId="LiveId" clId="{8B7AB1EC-9DFE-49F4-ABA1-52FD3DD0B185}" dt="2021-01-29T16:59:56.898" v="182" actId="11529"/>
+        <pc:spChg chg="add del">
+          <ac:chgData name="Vince McKeown" userId="31f1b572cc8f689e" providerId="LiveId" clId="{8B7AB1EC-9DFE-49F4-ABA1-52FD3DD0B185}" dt="2021-01-29T20:45:21.470" v="361" actId="478"/>
           <ac:spMkLst>
             <pc:docMk/>
             <pc:sldMk cId="1010719961" sldId="260"/>
             <ac:spMk id="21" creationId="{B35EC25C-BDF7-49C6-AC04-582DDB1CFFA8}"/>
           </ac:spMkLst>
         </pc:spChg>
-        <pc:spChg chg="add mod">
-          <ac:chgData name="Vince McKeown" userId="31f1b572cc8f689e" providerId="LiveId" clId="{8B7AB1EC-9DFE-49F4-ABA1-52FD3DD0B185}" dt="2021-01-29T17:00:13.704" v="185" actId="14100"/>
+        <pc:spChg chg="add del mod">
+          <ac:chgData name="Vince McKeown" userId="31f1b572cc8f689e" providerId="LiveId" clId="{8B7AB1EC-9DFE-49F4-ABA1-52FD3DD0B185}" dt="2021-01-29T20:45:21.470" v="361" actId="478"/>
           <ac:spMkLst>
             <pc:docMk/>
             <pc:sldMk cId="1010719961" sldId="260"/>
             <ac:spMk id="22" creationId="{DEBDB219-0F9F-4428-A9B4-1A6E21009014}"/>
           </ac:spMkLst>
         </pc:spChg>
-        <pc:picChg chg="add mod">
-          <ac:chgData name="Vince McKeown" userId="31f1b572cc8f689e" providerId="LiveId" clId="{8B7AB1EC-9DFE-49F4-ABA1-52FD3DD0B185}" dt="2021-01-29T16:55:51.534" v="87" actId="1076"/>
+        <pc:picChg chg="add del mod">
+          <ac:chgData name="Vince McKeown" userId="31f1b572cc8f689e" providerId="LiveId" clId="{8B7AB1EC-9DFE-49F4-ABA1-52FD3DD0B185}" dt="2021-01-29T20:45:07.334" v="357" actId="478"/>
           <ac:picMkLst>
             <pc:docMk/>
             <pc:sldMk cId="1010719961" sldId="260"/>
@@ -426,6 +443,13 @@
             <ac:spMk id="3" creationId="{00000000-0000-0000-0000-000000000000}"/>
           </ac:spMkLst>
         </pc:spChg>
+      </pc:sldChg>
+      <pc:sldChg chg="add">
+        <pc:chgData name="Vince McKeown" userId="31f1b572cc8f689e" providerId="LiveId" clId="{8B7AB1EC-9DFE-49F4-ABA1-52FD3DD0B185}" dt="2021-01-29T20:45:03.367" v="356" actId="2890"/>
+        <pc:sldMkLst>
+          <pc:docMk/>
+          <pc:sldMk cId="2230140587" sldId="264"/>
+        </pc:sldMkLst>
       </pc:sldChg>
       <pc:sldChg chg="modSp del mod">
         <pc:chgData name="Vince McKeown" userId="31f1b572cc8f689e" providerId="LiveId" clId="{8B7AB1EC-9DFE-49F4-ABA1-52FD3DD0B185}" dt="2021-01-29T18:57:36.298" v="355" actId="47"/>
@@ -8992,42 +9016,12 @@
           </a:p>
         </p:txBody>
       </p:sp>
-      <p:pic>
-        <p:nvPicPr>
-          <p:cNvPr id="6" name="Picture 5">
+      <p:sp>
+        <p:nvSpPr>
+          <p:cNvPr id="3" name="TextBox 2">
             <a:extLst>
               <a:ext uri="{FF2B5EF4-FFF2-40B4-BE49-F238E27FC236}">
-                <a16:creationId xmlns:a16="http://schemas.microsoft.com/office/drawing/2014/main" id="{0420B185-37C7-4ECA-B180-55EAC8B4C786}"/>
-              </a:ext>
-            </a:extLst>
-          </p:cNvPr>
-          <p:cNvPicPr>
-            <a:picLocks noChangeAspect="1"/>
-          </p:cNvPicPr>
-          <p:nvPr/>
-        </p:nvPicPr>
-        <p:blipFill>
-          <a:blip r:embed="rId2"/>
-          <a:stretch>
-            <a:fillRect/>
-          </a:stretch>
-        </p:blipFill>
-        <p:spPr>
-          <a:xfrm>
-            <a:off x="1266803" y="1900084"/>
-            <a:ext cx="4530213" cy="4530213"/>
-          </a:xfrm>
-          <a:prstGeom prst="rect">
-            <a:avLst/>
-          </a:prstGeom>
-        </p:spPr>
-      </p:pic>
-      <p:sp>
-        <p:nvSpPr>
-          <p:cNvPr id="7" name="TextBox 6">
-            <a:extLst>
-              <a:ext uri="{FF2B5EF4-FFF2-40B4-BE49-F238E27FC236}">
-                <a16:creationId xmlns:a16="http://schemas.microsoft.com/office/drawing/2014/main" id="{452C26FB-B953-4C73-B5D3-8F10655C4A4B}"/>
+                <a16:creationId xmlns:a16="http://schemas.microsoft.com/office/drawing/2014/main" id="{070E6662-9C59-433B-B0BA-F4FEDB67C197}"/>
               </a:ext>
             </a:extLst>
           </p:cNvPr>
@@ -9036,8 +9030,8 @@
         </p:nvSpPr>
         <p:spPr>
           <a:xfrm>
-            <a:off x="1341173" y="1288026"/>
-            <a:ext cx="4282879" cy="369332"/>
+            <a:off x="1704513" y="1544715"/>
+            <a:ext cx="4084773" cy="646331"/>
           </a:xfrm>
           <a:prstGeom prst="rect">
             <a:avLst/>
@@ -9045,270 +9039,6 @@
           <a:noFill/>
         </p:spPr>
         <p:txBody>
-          <a:bodyPr wrap="square" rtlCol="0">
-            <a:spAutoFit/>
-          </a:bodyPr>
-          <a:lstStyle/>
-          <a:p>
-            <a:pPr algn="ctr"/>
-            <a:r>
-              <a:rPr lang="en-US" dirty="0"/>
-              <a:t>World Map</a:t>
-            </a:r>
-          </a:p>
-        </p:txBody>
-      </p:sp>
-      <p:sp>
-        <p:nvSpPr>
-          <p:cNvPr id="8" name="Rectangle 7">
-            <a:extLst>
-              <a:ext uri="{FF2B5EF4-FFF2-40B4-BE49-F238E27FC236}">
-                <a16:creationId xmlns:a16="http://schemas.microsoft.com/office/drawing/2014/main" id="{BFE0A6FB-649C-4AAB-9709-ADAFED013A9C}"/>
-              </a:ext>
-            </a:extLst>
-          </p:cNvPr>
-          <p:cNvSpPr/>
-          <p:nvPr/>
-        </p:nvSpPr>
-        <p:spPr>
-          <a:xfrm>
-            <a:off x="6663915" y="747393"/>
-            <a:ext cx="4261282" cy="2707690"/>
-          </a:xfrm>
-          <a:prstGeom prst="rect">
-            <a:avLst/>
-          </a:prstGeom>
-        </p:spPr>
-        <p:style>
-          <a:lnRef idx="1">
-            <a:schemeClr val="dk1"/>
-          </a:lnRef>
-          <a:fillRef idx="2">
-            <a:schemeClr val="dk1"/>
-          </a:fillRef>
-          <a:effectRef idx="1">
-            <a:schemeClr val="dk1"/>
-          </a:effectRef>
-          <a:fontRef idx="minor">
-            <a:schemeClr val="dk1"/>
-          </a:fontRef>
-        </p:style>
-        <p:txBody>
-          <a:bodyPr rtlCol="0" anchor="ctr"/>
-          <a:lstStyle/>
-          <a:p>
-            <a:pPr algn="ctr"/>
-            <a:endParaRPr lang="en-US"/>
-          </a:p>
-        </p:txBody>
-      </p:sp>
-      <p:sp>
-        <p:nvSpPr>
-          <p:cNvPr id="12" name="Rectangle 11">
-            <a:extLst>
-              <a:ext uri="{FF2B5EF4-FFF2-40B4-BE49-F238E27FC236}">
-                <a16:creationId xmlns:a16="http://schemas.microsoft.com/office/drawing/2014/main" id="{793E7E51-BC37-4408-AE81-C27C93D88939}"/>
-              </a:ext>
-            </a:extLst>
-          </p:cNvPr>
-          <p:cNvSpPr/>
-          <p:nvPr/>
-        </p:nvSpPr>
-        <p:spPr>
-          <a:xfrm>
-            <a:off x="6663915" y="747393"/>
-            <a:ext cx="1565685" cy="1045895"/>
-          </a:xfrm>
-          <a:prstGeom prst="rect">
-            <a:avLst/>
-          </a:prstGeom>
-        </p:spPr>
-        <p:style>
-          <a:lnRef idx="2">
-            <a:schemeClr val="accent1">
-              <a:shade val="50000"/>
-            </a:schemeClr>
-          </a:lnRef>
-          <a:fillRef idx="1">
-            <a:schemeClr val="accent1"/>
-          </a:fillRef>
-          <a:effectRef idx="0">
-            <a:schemeClr val="accent1"/>
-          </a:effectRef>
-          <a:fontRef idx="minor">
-            <a:schemeClr val="lt1"/>
-          </a:fontRef>
-        </p:style>
-        <p:txBody>
-          <a:bodyPr rtlCol="0" anchor="ctr"/>
-          <a:lstStyle/>
-          <a:p>
-            <a:pPr algn="ctr"/>
-            <a:endParaRPr lang="en-US"/>
-          </a:p>
-        </p:txBody>
-      </p:sp>
-      <p:sp>
-        <p:nvSpPr>
-          <p:cNvPr id="13" name="Rectangle 12">
-            <a:extLst>
-              <a:ext uri="{FF2B5EF4-FFF2-40B4-BE49-F238E27FC236}">
-                <a16:creationId xmlns:a16="http://schemas.microsoft.com/office/drawing/2014/main" id="{4ED3B728-6F0E-4D93-86F7-BAAAAC43BDEE}"/>
-              </a:ext>
-            </a:extLst>
-          </p:cNvPr>
-          <p:cNvSpPr/>
-          <p:nvPr/>
-        </p:nvSpPr>
-        <p:spPr>
-          <a:xfrm>
-            <a:off x="8966448" y="747393"/>
-            <a:ext cx="1958750" cy="735176"/>
-          </a:xfrm>
-          <a:prstGeom prst="rect">
-            <a:avLst/>
-          </a:prstGeom>
-        </p:spPr>
-        <p:style>
-          <a:lnRef idx="2">
-            <a:schemeClr val="accent1">
-              <a:shade val="50000"/>
-            </a:schemeClr>
-          </a:lnRef>
-          <a:fillRef idx="1">
-            <a:schemeClr val="accent1"/>
-          </a:fillRef>
-          <a:effectRef idx="0">
-            <a:schemeClr val="accent1"/>
-          </a:effectRef>
-          <a:fontRef idx="minor">
-            <a:schemeClr val="lt1"/>
-          </a:fontRef>
-        </p:style>
-        <p:txBody>
-          <a:bodyPr rtlCol="0" anchor="ctr"/>
-          <a:lstStyle/>
-          <a:p>
-            <a:pPr algn="ctr"/>
-            <a:endParaRPr lang="en-US"/>
-          </a:p>
-        </p:txBody>
-      </p:sp>
-      <p:sp>
-        <p:nvSpPr>
-          <p:cNvPr id="14" name="Rectangle 13">
-            <a:extLst>
-              <a:ext uri="{FF2B5EF4-FFF2-40B4-BE49-F238E27FC236}">
-                <a16:creationId xmlns:a16="http://schemas.microsoft.com/office/drawing/2014/main" id="{2689C65E-7058-4D51-AF10-800FD879ED39}"/>
-              </a:ext>
-            </a:extLst>
-          </p:cNvPr>
-          <p:cNvSpPr/>
-          <p:nvPr/>
-        </p:nvSpPr>
-        <p:spPr>
-          <a:xfrm>
-            <a:off x="8700117" y="1970841"/>
-            <a:ext cx="2225080" cy="1482571"/>
-          </a:xfrm>
-          <a:prstGeom prst="rect">
-            <a:avLst/>
-          </a:prstGeom>
-        </p:spPr>
-        <p:style>
-          <a:lnRef idx="2">
-            <a:schemeClr val="accent1">
-              <a:shade val="50000"/>
-            </a:schemeClr>
-          </a:lnRef>
-          <a:fillRef idx="1">
-            <a:schemeClr val="accent1"/>
-          </a:fillRef>
-          <a:effectRef idx="0">
-            <a:schemeClr val="accent1"/>
-          </a:effectRef>
-          <a:fontRef idx="minor">
-            <a:schemeClr val="lt1"/>
-          </a:fontRef>
-        </p:style>
-        <p:txBody>
-          <a:bodyPr rtlCol="0" anchor="ctr"/>
-          <a:lstStyle/>
-          <a:p>
-            <a:pPr algn="ctr"/>
-            <a:endParaRPr lang="en-US"/>
-          </a:p>
-        </p:txBody>
-      </p:sp>
-      <p:sp>
-        <p:nvSpPr>
-          <p:cNvPr id="15" name="Rectangle 14">
-            <a:extLst>
-              <a:ext uri="{FF2B5EF4-FFF2-40B4-BE49-F238E27FC236}">
-                <a16:creationId xmlns:a16="http://schemas.microsoft.com/office/drawing/2014/main" id="{FF604C26-E5AB-4156-824D-F737E4C8CCC5}"/>
-              </a:ext>
-            </a:extLst>
-          </p:cNvPr>
-          <p:cNvSpPr/>
-          <p:nvPr/>
-        </p:nvSpPr>
-        <p:spPr>
-          <a:xfrm>
-            <a:off x="6663914" y="2246049"/>
-            <a:ext cx="1565686" cy="1207363"/>
-          </a:xfrm>
-          <a:prstGeom prst="rect">
-            <a:avLst/>
-          </a:prstGeom>
-        </p:spPr>
-        <p:style>
-          <a:lnRef idx="2">
-            <a:schemeClr val="accent1">
-              <a:shade val="50000"/>
-            </a:schemeClr>
-          </a:lnRef>
-          <a:fillRef idx="1">
-            <a:schemeClr val="accent1"/>
-          </a:fillRef>
-          <a:effectRef idx="0">
-            <a:schemeClr val="accent1"/>
-          </a:effectRef>
-          <a:fontRef idx="minor">
-            <a:schemeClr val="lt1"/>
-          </a:fontRef>
-        </p:style>
-        <p:txBody>
-          <a:bodyPr rtlCol="0" anchor="ctr"/>
-          <a:lstStyle/>
-          <a:p>
-            <a:pPr algn="ctr"/>
-            <a:endParaRPr lang="en-US"/>
-          </a:p>
-        </p:txBody>
-      </p:sp>
-      <p:sp>
-        <p:nvSpPr>
-          <p:cNvPr id="16" name="TextBox 15">
-            <a:extLst>
-              <a:ext uri="{FF2B5EF4-FFF2-40B4-BE49-F238E27FC236}">
-                <a16:creationId xmlns:a16="http://schemas.microsoft.com/office/drawing/2014/main" id="{1B5B0A3E-CA52-478F-AF43-234F89BBB78E}"/>
-              </a:ext>
-            </a:extLst>
-          </p:cNvPr>
-          <p:cNvSpPr txBox="1"/>
-          <p:nvPr/>
-        </p:nvSpPr>
-        <p:spPr>
-          <a:xfrm>
-            <a:off x="6725220" y="363492"/>
-            <a:ext cx="2396810" cy="369332"/>
-          </a:xfrm>
-          <a:prstGeom prst="rect">
-            <a:avLst/>
-          </a:prstGeom>
-          <a:noFill/>
-        </p:spPr>
-        <p:txBody>
           <a:bodyPr wrap="none" rtlCol="0">
             <a:spAutoFit/>
           </a:bodyPr>
@@ -9316,271 +9046,15 @@
           <a:p>
             <a:r>
               <a:rPr lang="en-US" dirty="0"/>
-              <a:t>Dungeon 1:  Level 1</a:t>
-            </a:r>
-          </a:p>
-        </p:txBody>
-      </p:sp>
-      <p:sp>
-        <p:nvSpPr>
-          <p:cNvPr id="17" name="Rectangle 16">
-            <a:extLst>
-              <a:ext uri="{FF2B5EF4-FFF2-40B4-BE49-F238E27FC236}">
-                <a16:creationId xmlns:a16="http://schemas.microsoft.com/office/drawing/2014/main" id="{53052C51-D451-4860-A2E3-4BD866D53D28}"/>
-              </a:ext>
-            </a:extLst>
-          </p:cNvPr>
-          <p:cNvSpPr/>
-          <p:nvPr/>
-        </p:nvSpPr>
-        <p:spPr>
-          <a:xfrm>
-            <a:off x="6663914" y="4045032"/>
-            <a:ext cx="4261282" cy="2707690"/>
-          </a:xfrm>
-          <a:prstGeom prst="rect">
-            <a:avLst/>
-          </a:prstGeom>
-        </p:spPr>
-        <p:style>
-          <a:lnRef idx="1">
-            <a:schemeClr val="dk1"/>
-          </a:lnRef>
-          <a:fillRef idx="2">
-            <a:schemeClr val="dk1"/>
-          </a:fillRef>
-          <a:effectRef idx="1">
-            <a:schemeClr val="dk1"/>
-          </a:effectRef>
-          <a:fontRef idx="minor">
-            <a:schemeClr val="dk1"/>
-          </a:fontRef>
-        </p:style>
-        <p:txBody>
-          <a:bodyPr rtlCol="0" anchor="ctr"/>
-          <a:lstStyle/>
-          <a:p>
-            <a:pPr algn="ctr"/>
-            <a:endParaRPr lang="en-US"/>
-          </a:p>
-        </p:txBody>
-      </p:sp>
-      <p:sp>
-        <p:nvSpPr>
-          <p:cNvPr id="18" name="TextBox 17">
-            <a:extLst>
-              <a:ext uri="{FF2B5EF4-FFF2-40B4-BE49-F238E27FC236}">
-                <a16:creationId xmlns:a16="http://schemas.microsoft.com/office/drawing/2014/main" id="{0456882E-3070-42E0-B8DC-67561F6F31E9}"/>
-              </a:ext>
-            </a:extLst>
-          </p:cNvPr>
-          <p:cNvSpPr txBox="1"/>
-          <p:nvPr/>
-        </p:nvSpPr>
-        <p:spPr>
-          <a:xfrm>
-            <a:off x="6725220" y="3675700"/>
-            <a:ext cx="2396810" cy="369332"/>
-          </a:xfrm>
-          <a:prstGeom prst="rect">
-            <a:avLst/>
-          </a:prstGeom>
-          <a:noFill/>
-        </p:spPr>
-        <p:txBody>
-          <a:bodyPr wrap="none" rtlCol="0">
-            <a:spAutoFit/>
-          </a:bodyPr>
-          <a:lstStyle/>
-          <a:p>
-            <a:r>
-              <a:rPr lang="en-US" dirty="0"/>
-              <a:t>Dungeon 1:  Level 2</a:t>
-            </a:r>
-          </a:p>
-        </p:txBody>
-      </p:sp>
-      <p:sp>
-        <p:nvSpPr>
-          <p:cNvPr id="19" name="Rectangle 18">
-            <a:extLst>
-              <a:ext uri="{FF2B5EF4-FFF2-40B4-BE49-F238E27FC236}">
-                <a16:creationId xmlns:a16="http://schemas.microsoft.com/office/drawing/2014/main" id="{B5BE306C-F376-4015-A9B6-7B917DF7AE62}"/>
-              </a:ext>
-            </a:extLst>
-          </p:cNvPr>
-          <p:cNvSpPr/>
-          <p:nvPr/>
-        </p:nvSpPr>
-        <p:spPr>
-          <a:xfrm>
-            <a:off x="6663913" y="4045032"/>
-            <a:ext cx="2396810" cy="1654432"/>
-          </a:xfrm>
-          <a:prstGeom prst="rect">
-            <a:avLst/>
-          </a:prstGeom>
-        </p:spPr>
-        <p:style>
-          <a:lnRef idx="2">
-            <a:schemeClr val="accent1">
-              <a:shade val="50000"/>
-            </a:schemeClr>
-          </a:lnRef>
-          <a:fillRef idx="1">
-            <a:schemeClr val="accent1"/>
-          </a:fillRef>
-          <a:effectRef idx="0">
-            <a:schemeClr val="accent1"/>
-          </a:effectRef>
-          <a:fontRef idx="minor">
-            <a:schemeClr val="lt1"/>
-          </a:fontRef>
-        </p:style>
-        <p:txBody>
-          <a:bodyPr rtlCol="0" anchor="ctr"/>
-          <a:lstStyle/>
-          <a:p>
-            <a:pPr algn="ctr"/>
-            <a:endParaRPr lang="en-US"/>
-          </a:p>
-        </p:txBody>
-      </p:sp>
-      <p:sp>
-        <p:nvSpPr>
-          <p:cNvPr id="20" name="Rectangle 19">
-            <a:extLst>
-              <a:ext uri="{FF2B5EF4-FFF2-40B4-BE49-F238E27FC236}">
-                <a16:creationId xmlns:a16="http://schemas.microsoft.com/office/drawing/2014/main" id="{4C013E77-0EBB-4155-8ABA-D42323C0771B}"/>
-              </a:ext>
-            </a:extLst>
-          </p:cNvPr>
-          <p:cNvSpPr/>
-          <p:nvPr/>
-        </p:nvSpPr>
-        <p:spPr>
-          <a:xfrm>
-            <a:off x="9060723" y="4045032"/>
-            <a:ext cx="1864473" cy="775543"/>
-          </a:xfrm>
-          <a:prstGeom prst="rect">
-            <a:avLst/>
-          </a:prstGeom>
-        </p:spPr>
-        <p:style>
-          <a:lnRef idx="2">
-            <a:schemeClr val="accent1">
-              <a:shade val="50000"/>
-            </a:schemeClr>
-          </a:lnRef>
-          <a:fillRef idx="1">
-            <a:schemeClr val="accent1"/>
-          </a:fillRef>
-          <a:effectRef idx="0">
-            <a:schemeClr val="accent1"/>
-          </a:effectRef>
-          <a:fontRef idx="minor">
-            <a:schemeClr val="lt1"/>
-          </a:fontRef>
-        </p:style>
-        <p:txBody>
-          <a:bodyPr rtlCol="0" anchor="ctr"/>
-          <a:lstStyle/>
-          <a:p>
-            <a:pPr algn="ctr"/>
-            <a:endParaRPr lang="en-US"/>
-          </a:p>
-        </p:txBody>
-      </p:sp>
-      <p:sp>
-        <p:nvSpPr>
-          <p:cNvPr id="21" name="Rectangle 20">
-            <a:extLst>
-              <a:ext uri="{FF2B5EF4-FFF2-40B4-BE49-F238E27FC236}">
-                <a16:creationId xmlns:a16="http://schemas.microsoft.com/office/drawing/2014/main" id="{B35EC25C-BDF7-49C6-AC04-582DDB1CFFA8}"/>
-              </a:ext>
-            </a:extLst>
-          </p:cNvPr>
-          <p:cNvSpPr/>
-          <p:nvPr/>
-        </p:nvSpPr>
-        <p:spPr>
-          <a:xfrm>
-            <a:off x="9658905" y="4820575"/>
-            <a:ext cx="1266291" cy="1932147"/>
-          </a:xfrm>
-          <a:prstGeom prst="rect">
-            <a:avLst/>
-          </a:prstGeom>
-        </p:spPr>
-        <p:style>
-          <a:lnRef idx="2">
-            <a:schemeClr val="accent1">
-              <a:shade val="50000"/>
-            </a:schemeClr>
-          </a:lnRef>
-          <a:fillRef idx="1">
-            <a:schemeClr val="accent1"/>
-          </a:fillRef>
-          <a:effectRef idx="0">
-            <a:schemeClr val="accent1"/>
-          </a:effectRef>
-          <a:fontRef idx="minor">
-            <a:schemeClr val="lt1"/>
-          </a:fontRef>
-        </p:style>
-        <p:txBody>
-          <a:bodyPr rtlCol="0" anchor="ctr"/>
-          <a:lstStyle/>
-          <a:p>
-            <a:pPr algn="ctr"/>
-            <a:endParaRPr lang="en-US"/>
-          </a:p>
-        </p:txBody>
-      </p:sp>
-      <p:sp>
-        <p:nvSpPr>
-          <p:cNvPr id="22" name="Rectangle 21">
-            <a:extLst>
-              <a:ext uri="{FF2B5EF4-FFF2-40B4-BE49-F238E27FC236}">
-                <a16:creationId xmlns:a16="http://schemas.microsoft.com/office/drawing/2014/main" id="{DEBDB219-0F9F-4428-A9B4-1A6E21009014}"/>
-              </a:ext>
-            </a:extLst>
-          </p:cNvPr>
-          <p:cNvSpPr/>
-          <p:nvPr/>
-        </p:nvSpPr>
-        <p:spPr>
-          <a:xfrm>
-            <a:off x="6672791" y="6110607"/>
-            <a:ext cx="2568864" cy="642115"/>
-          </a:xfrm>
-          <a:prstGeom prst="rect">
-            <a:avLst/>
-          </a:prstGeom>
-        </p:spPr>
-        <p:style>
-          <a:lnRef idx="2">
-            <a:schemeClr val="accent1">
-              <a:shade val="50000"/>
-            </a:schemeClr>
-          </a:lnRef>
-          <a:fillRef idx="1">
-            <a:schemeClr val="accent1"/>
-          </a:fillRef>
-          <a:effectRef idx="0">
-            <a:schemeClr val="accent1"/>
-          </a:effectRef>
-          <a:fontRef idx="minor">
-            <a:schemeClr val="lt1"/>
-          </a:fontRef>
-        </p:style>
-        <p:txBody>
-          <a:bodyPr rtlCol="0" anchor="ctr"/>
-          <a:lstStyle/>
-          <a:p>
-            <a:pPr algn="ctr"/>
-            <a:endParaRPr lang="en-US"/>
+              <a:t>A Top Down RPG Adventure game</a:t>
+            </a:r>
+          </a:p>
+          <a:p>
+            <a:pPr marL="285750" indent="-285750">
+              <a:buFont typeface="Arial" panose="020B0604020202020204" pitchFamily="34" charset="0"/>
+              <a:buChar char="•"/>
+            </a:pPr>
+            <a:endParaRPr lang="en-US" dirty="0"/>
           </a:p>
         </p:txBody>
       </p:sp>
@@ -9624,50 +9098,619 @@
             <p:ph type="title"/>
           </p:nvPr>
         </p:nvSpPr>
-        <p:spPr/>
+        <p:spPr>
+          <a:xfrm>
+            <a:off x="1341173" y="105278"/>
+            <a:ext cx="8911687" cy="1280890"/>
+          </a:xfrm>
+        </p:spPr>
         <p:txBody>
           <a:bodyPr/>
           <a:lstStyle/>
           <a:p>
             <a:r>
               <a:rPr lang="en-US" dirty="0"/>
-              <a:t>Schedule</a:t>
-            </a:r>
-          </a:p>
-        </p:txBody>
-      </p:sp>
-      <p:sp>
-        <p:nvSpPr>
-          <p:cNvPr id="3" name="Content Placeholder 2"/>
-          <p:cNvSpPr>
-            <a:spLocks noGrp="1"/>
-          </p:cNvSpPr>
-          <p:nvPr>
-            <p:ph idx="1"/>
-          </p:nvPr>
-        </p:nvSpPr>
-        <p:spPr/>
-        <p:txBody>
-          <a:bodyPr/>
-          <a:lstStyle/>
-          <a:p>
+              <a:t>Vision</a:t>
+            </a:r>
+          </a:p>
+        </p:txBody>
+      </p:sp>
+      <p:pic>
+        <p:nvPicPr>
+          <p:cNvPr id="6" name="Picture 5">
+            <a:extLst>
+              <a:ext uri="{FF2B5EF4-FFF2-40B4-BE49-F238E27FC236}">
+                <a16:creationId xmlns:a16="http://schemas.microsoft.com/office/drawing/2014/main" id="{0420B185-37C7-4ECA-B180-55EAC8B4C786}"/>
+              </a:ext>
+            </a:extLst>
+          </p:cNvPr>
+          <p:cNvPicPr>
+            <a:picLocks noChangeAspect="1"/>
+          </p:cNvPicPr>
+          <p:nvPr/>
+        </p:nvPicPr>
+        <p:blipFill>
+          <a:blip r:embed="rId2"/>
+          <a:stretch>
+            <a:fillRect/>
+          </a:stretch>
+        </p:blipFill>
+        <p:spPr>
+          <a:xfrm>
+            <a:off x="1266803" y="1900084"/>
+            <a:ext cx="4530213" cy="4530213"/>
+          </a:xfrm>
+          <a:prstGeom prst="rect">
+            <a:avLst/>
+          </a:prstGeom>
+        </p:spPr>
+      </p:pic>
+      <p:sp>
+        <p:nvSpPr>
+          <p:cNvPr id="7" name="TextBox 6">
+            <a:extLst>
+              <a:ext uri="{FF2B5EF4-FFF2-40B4-BE49-F238E27FC236}">
+                <a16:creationId xmlns:a16="http://schemas.microsoft.com/office/drawing/2014/main" id="{452C26FB-B953-4C73-B5D3-8F10655C4A4B}"/>
+              </a:ext>
+            </a:extLst>
+          </p:cNvPr>
+          <p:cNvSpPr txBox="1"/>
+          <p:nvPr/>
+        </p:nvSpPr>
+        <p:spPr>
+          <a:xfrm>
+            <a:off x="1341173" y="1288026"/>
+            <a:ext cx="4282879" cy="369332"/>
+          </a:xfrm>
+          <a:prstGeom prst="rect">
+            <a:avLst/>
+          </a:prstGeom>
+          <a:noFill/>
+        </p:spPr>
+        <p:txBody>
+          <a:bodyPr wrap="square" rtlCol="0">
+            <a:spAutoFit/>
+          </a:bodyPr>
+          <a:lstStyle/>
+          <a:p>
+            <a:pPr algn="ctr"/>
             <a:r>
               <a:rPr lang="en-US" dirty="0"/>
-              <a:t>Cutover to Trello</a:t>
-            </a:r>
-          </a:p>
-          <a:p>
-            <a:pPr marL="0" indent="0">
-              <a:buNone/>
-            </a:pPr>
-            <a:endParaRPr lang="en-US" dirty="0"/>
+              <a:t>World Map</a:t>
+            </a:r>
+          </a:p>
+        </p:txBody>
+      </p:sp>
+      <p:sp>
+        <p:nvSpPr>
+          <p:cNvPr id="8" name="Rectangle 7">
+            <a:extLst>
+              <a:ext uri="{FF2B5EF4-FFF2-40B4-BE49-F238E27FC236}">
+                <a16:creationId xmlns:a16="http://schemas.microsoft.com/office/drawing/2014/main" id="{BFE0A6FB-649C-4AAB-9709-ADAFED013A9C}"/>
+              </a:ext>
+            </a:extLst>
+          </p:cNvPr>
+          <p:cNvSpPr/>
+          <p:nvPr/>
+        </p:nvSpPr>
+        <p:spPr>
+          <a:xfrm>
+            <a:off x="6663915" y="747393"/>
+            <a:ext cx="4261282" cy="2707690"/>
+          </a:xfrm>
+          <a:prstGeom prst="rect">
+            <a:avLst/>
+          </a:prstGeom>
+        </p:spPr>
+        <p:style>
+          <a:lnRef idx="1">
+            <a:schemeClr val="dk1"/>
+          </a:lnRef>
+          <a:fillRef idx="2">
+            <a:schemeClr val="dk1"/>
+          </a:fillRef>
+          <a:effectRef idx="1">
+            <a:schemeClr val="dk1"/>
+          </a:effectRef>
+          <a:fontRef idx="minor">
+            <a:schemeClr val="dk1"/>
+          </a:fontRef>
+        </p:style>
+        <p:txBody>
+          <a:bodyPr rtlCol="0" anchor="ctr"/>
+          <a:lstStyle/>
+          <a:p>
+            <a:pPr algn="ctr"/>
+            <a:endParaRPr lang="en-US"/>
+          </a:p>
+        </p:txBody>
+      </p:sp>
+      <p:sp>
+        <p:nvSpPr>
+          <p:cNvPr id="12" name="Rectangle 11">
+            <a:extLst>
+              <a:ext uri="{FF2B5EF4-FFF2-40B4-BE49-F238E27FC236}">
+                <a16:creationId xmlns:a16="http://schemas.microsoft.com/office/drawing/2014/main" id="{793E7E51-BC37-4408-AE81-C27C93D88939}"/>
+              </a:ext>
+            </a:extLst>
+          </p:cNvPr>
+          <p:cNvSpPr/>
+          <p:nvPr/>
+        </p:nvSpPr>
+        <p:spPr>
+          <a:xfrm>
+            <a:off x="6663915" y="747393"/>
+            <a:ext cx="1565685" cy="1045895"/>
+          </a:xfrm>
+          <a:prstGeom prst="rect">
+            <a:avLst/>
+          </a:prstGeom>
+        </p:spPr>
+        <p:style>
+          <a:lnRef idx="2">
+            <a:schemeClr val="accent1">
+              <a:shade val="50000"/>
+            </a:schemeClr>
+          </a:lnRef>
+          <a:fillRef idx="1">
+            <a:schemeClr val="accent1"/>
+          </a:fillRef>
+          <a:effectRef idx="0">
+            <a:schemeClr val="accent1"/>
+          </a:effectRef>
+          <a:fontRef idx="minor">
+            <a:schemeClr val="lt1"/>
+          </a:fontRef>
+        </p:style>
+        <p:txBody>
+          <a:bodyPr rtlCol="0" anchor="ctr"/>
+          <a:lstStyle/>
+          <a:p>
+            <a:pPr algn="ctr"/>
+            <a:endParaRPr lang="en-US"/>
+          </a:p>
+        </p:txBody>
+      </p:sp>
+      <p:sp>
+        <p:nvSpPr>
+          <p:cNvPr id="13" name="Rectangle 12">
+            <a:extLst>
+              <a:ext uri="{FF2B5EF4-FFF2-40B4-BE49-F238E27FC236}">
+                <a16:creationId xmlns:a16="http://schemas.microsoft.com/office/drawing/2014/main" id="{4ED3B728-6F0E-4D93-86F7-BAAAAC43BDEE}"/>
+              </a:ext>
+            </a:extLst>
+          </p:cNvPr>
+          <p:cNvSpPr/>
+          <p:nvPr/>
+        </p:nvSpPr>
+        <p:spPr>
+          <a:xfrm>
+            <a:off x="8966448" y="747393"/>
+            <a:ext cx="1958750" cy="735176"/>
+          </a:xfrm>
+          <a:prstGeom prst="rect">
+            <a:avLst/>
+          </a:prstGeom>
+        </p:spPr>
+        <p:style>
+          <a:lnRef idx="2">
+            <a:schemeClr val="accent1">
+              <a:shade val="50000"/>
+            </a:schemeClr>
+          </a:lnRef>
+          <a:fillRef idx="1">
+            <a:schemeClr val="accent1"/>
+          </a:fillRef>
+          <a:effectRef idx="0">
+            <a:schemeClr val="accent1"/>
+          </a:effectRef>
+          <a:fontRef idx="minor">
+            <a:schemeClr val="lt1"/>
+          </a:fontRef>
+        </p:style>
+        <p:txBody>
+          <a:bodyPr rtlCol="0" anchor="ctr"/>
+          <a:lstStyle/>
+          <a:p>
+            <a:pPr algn="ctr"/>
+            <a:endParaRPr lang="en-US"/>
+          </a:p>
+        </p:txBody>
+      </p:sp>
+      <p:sp>
+        <p:nvSpPr>
+          <p:cNvPr id="14" name="Rectangle 13">
+            <a:extLst>
+              <a:ext uri="{FF2B5EF4-FFF2-40B4-BE49-F238E27FC236}">
+                <a16:creationId xmlns:a16="http://schemas.microsoft.com/office/drawing/2014/main" id="{2689C65E-7058-4D51-AF10-800FD879ED39}"/>
+              </a:ext>
+            </a:extLst>
+          </p:cNvPr>
+          <p:cNvSpPr/>
+          <p:nvPr/>
+        </p:nvSpPr>
+        <p:spPr>
+          <a:xfrm>
+            <a:off x="8700117" y="1970841"/>
+            <a:ext cx="2225080" cy="1482571"/>
+          </a:xfrm>
+          <a:prstGeom prst="rect">
+            <a:avLst/>
+          </a:prstGeom>
+        </p:spPr>
+        <p:style>
+          <a:lnRef idx="2">
+            <a:schemeClr val="accent1">
+              <a:shade val="50000"/>
+            </a:schemeClr>
+          </a:lnRef>
+          <a:fillRef idx="1">
+            <a:schemeClr val="accent1"/>
+          </a:fillRef>
+          <a:effectRef idx="0">
+            <a:schemeClr val="accent1"/>
+          </a:effectRef>
+          <a:fontRef idx="minor">
+            <a:schemeClr val="lt1"/>
+          </a:fontRef>
+        </p:style>
+        <p:txBody>
+          <a:bodyPr rtlCol="0" anchor="ctr"/>
+          <a:lstStyle/>
+          <a:p>
+            <a:pPr algn="ctr"/>
+            <a:endParaRPr lang="en-US"/>
+          </a:p>
+        </p:txBody>
+      </p:sp>
+      <p:sp>
+        <p:nvSpPr>
+          <p:cNvPr id="15" name="Rectangle 14">
+            <a:extLst>
+              <a:ext uri="{FF2B5EF4-FFF2-40B4-BE49-F238E27FC236}">
+                <a16:creationId xmlns:a16="http://schemas.microsoft.com/office/drawing/2014/main" id="{FF604C26-E5AB-4156-824D-F737E4C8CCC5}"/>
+              </a:ext>
+            </a:extLst>
+          </p:cNvPr>
+          <p:cNvSpPr/>
+          <p:nvPr/>
+        </p:nvSpPr>
+        <p:spPr>
+          <a:xfrm>
+            <a:off x="6663914" y="2246049"/>
+            <a:ext cx="1565686" cy="1207363"/>
+          </a:xfrm>
+          <a:prstGeom prst="rect">
+            <a:avLst/>
+          </a:prstGeom>
+        </p:spPr>
+        <p:style>
+          <a:lnRef idx="2">
+            <a:schemeClr val="accent1">
+              <a:shade val="50000"/>
+            </a:schemeClr>
+          </a:lnRef>
+          <a:fillRef idx="1">
+            <a:schemeClr val="accent1"/>
+          </a:fillRef>
+          <a:effectRef idx="0">
+            <a:schemeClr val="accent1"/>
+          </a:effectRef>
+          <a:fontRef idx="minor">
+            <a:schemeClr val="lt1"/>
+          </a:fontRef>
+        </p:style>
+        <p:txBody>
+          <a:bodyPr rtlCol="0" anchor="ctr"/>
+          <a:lstStyle/>
+          <a:p>
+            <a:pPr algn="ctr"/>
+            <a:endParaRPr lang="en-US"/>
+          </a:p>
+        </p:txBody>
+      </p:sp>
+      <p:sp>
+        <p:nvSpPr>
+          <p:cNvPr id="16" name="TextBox 15">
+            <a:extLst>
+              <a:ext uri="{FF2B5EF4-FFF2-40B4-BE49-F238E27FC236}">
+                <a16:creationId xmlns:a16="http://schemas.microsoft.com/office/drawing/2014/main" id="{1B5B0A3E-CA52-478F-AF43-234F89BBB78E}"/>
+              </a:ext>
+            </a:extLst>
+          </p:cNvPr>
+          <p:cNvSpPr txBox="1"/>
+          <p:nvPr/>
+        </p:nvSpPr>
+        <p:spPr>
+          <a:xfrm>
+            <a:off x="6725220" y="363492"/>
+            <a:ext cx="2396810" cy="369332"/>
+          </a:xfrm>
+          <a:prstGeom prst="rect">
+            <a:avLst/>
+          </a:prstGeom>
+          <a:noFill/>
+        </p:spPr>
+        <p:txBody>
+          <a:bodyPr wrap="none" rtlCol="0">
+            <a:spAutoFit/>
+          </a:bodyPr>
+          <a:lstStyle/>
+          <a:p>
+            <a:r>
+              <a:rPr lang="en-US" dirty="0"/>
+              <a:t>Dungeon 1:  Level 1</a:t>
+            </a:r>
+          </a:p>
+        </p:txBody>
+      </p:sp>
+      <p:sp>
+        <p:nvSpPr>
+          <p:cNvPr id="17" name="Rectangle 16">
+            <a:extLst>
+              <a:ext uri="{FF2B5EF4-FFF2-40B4-BE49-F238E27FC236}">
+                <a16:creationId xmlns:a16="http://schemas.microsoft.com/office/drawing/2014/main" id="{53052C51-D451-4860-A2E3-4BD866D53D28}"/>
+              </a:ext>
+            </a:extLst>
+          </p:cNvPr>
+          <p:cNvSpPr/>
+          <p:nvPr/>
+        </p:nvSpPr>
+        <p:spPr>
+          <a:xfrm>
+            <a:off x="6663914" y="4045032"/>
+            <a:ext cx="4261282" cy="2707690"/>
+          </a:xfrm>
+          <a:prstGeom prst="rect">
+            <a:avLst/>
+          </a:prstGeom>
+        </p:spPr>
+        <p:style>
+          <a:lnRef idx="1">
+            <a:schemeClr val="dk1"/>
+          </a:lnRef>
+          <a:fillRef idx="2">
+            <a:schemeClr val="dk1"/>
+          </a:fillRef>
+          <a:effectRef idx="1">
+            <a:schemeClr val="dk1"/>
+          </a:effectRef>
+          <a:fontRef idx="minor">
+            <a:schemeClr val="dk1"/>
+          </a:fontRef>
+        </p:style>
+        <p:txBody>
+          <a:bodyPr rtlCol="0" anchor="ctr"/>
+          <a:lstStyle/>
+          <a:p>
+            <a:pPr algn="ctr"/>
+            <a:endParaRPr lang="en-US"/>
+          </a:p>
+        </p:txBody>
+      </p:sp>
+      <p:sp>
+        <p:nvSpPr>
+          <p:cNvPr id="18" name="TextBox 17">
+            <a:extLst>
+              <a:ext uri="{FF2B5EF4-FFF2-40B4-BE49-F238E27FC236}">
+                <a16:creationId xmlns:a16="http://schemas.microsoft.com/office/drawing/2014/main" id="{0456882E-3070-42E0-B8DC-67561F6F31E9}"/>
+              </a:ext>
+            </a:extLst>
+          </p:cNvPr>
+          <p:cNvSpPr txBox="1"/>
+          <p:nvPr/>
+        </p:nvSpPr>
+        <p:spPr>
+          <a:xfrm>
+            <a:off x="6725220" y="3675700"/>
+            <a:ext cx="2396810" cy="369332"/>
+          </a:xfrm>
+          <a:prstGeom prst="rect">
+            <a:avLst/>
+          </a:prstGeom>
+          <a:noFill/>
+        </p:spPr>
+        <p:txBody>
+          <a:bodyPr wrap="none" rtlCol="0">
+            <a:spAutoFit/>
+          </a:bodyPr>
+          <a:lstStyle/>
+          <a:p>
+            <a:r>
+              <a:rPr lang="en-US" dirty="0"/>
+              <a:t>Dungeon 1:  Level 2</a:t>
+            </a:r>
+          </a:p>
+        </p:txBody>
+      </p:sp>
+      <p:sp>
+        <p:nvSpPr>
+          <p:cNvPr id="19" name="Rectangle 18">
+            <a:extLst>
+              <a:ext uri="{FF2B5EF4-FFF2-40B4-BE49-F238E27FC236}">
+                <a16:creationId xmlns:a16="http://schemas.microsoft.com/office/drawing/2014/main" id="{B5BE306C-F376-4015-A9B6-7B917DF7AE62}"/>
+              </a:ext>
+            </a:extLst>
+          </p:cNvPr>
+          <p:cNvSpPr/>
+          <p:nvPr/>
+        </p:nvSpPr>
+        <p:spPr>
+          <a:xfrm>
+            <a:off x="6663913" y="4045032"/>
+            <a:ext cx="2396810" cy="1654432"/>
+          </a:xfrm>
+          <a:prstGeom prst="rect">
+            <a:avLst/>
+          </a:prstGeom>
+        </p:spPr>
+        <p:style>
+          <a:lnRef idx="2">
+            <a:schemeClr val="accent1">
+              <a:shade val="50000"/>
+            </a:schemeClr>
+          </a:lnRef>
+          <a:fillRef idx="1">
+            <a:schemeClr val="accent1"/>
+          </a:fillRef>
+          <a:effectRef idx="0">
+            <a:schemeClr val="accent1"/>
+          </a:effectRef>
+          <a:fontRef idx="minor">
+            <a:schemeClr val="lt1"/>
+          </a:fontRef>
+        </p:style>
+        <p:txBody>
+          <a:bodyPr rtlCol="0" anchor="ctr"/>
+          <a:lstStyle/>
+          <a:p>
+            <a:pPr algn="ctr"/>
+            <a:endParaRPr lang="en-US"/>
+          </a:p>
+        </p:txBody>
+      </p:sp>
+      <p:sp>
+        <p:nvSpPr>
+          <p:cNvPr id="20" name="Rectangle 19">
+            <a:extLst>
+              <a:ext uri="{FF2B5EF4-FFF2-40B4-BE49-F238E27FC236}">
+                <a16:creationId xmlns:a16="http://schemas.microsoft.com/office/drawing/2014/main" id="{4C013E77-0EBB-4155-8ABA-D42323C0771B}"/>
+              </a:ext>
+            </a:extLst>
+          </p:cNvPr>
+          <p:cNvSpPr/>
+          <p:nvPr/>
+        </p:nvSpPr>
+        <p:spPr>
+          <a:xfrm>
+            <a:off x="9060723" y="4045032"/>
+            <a:ext cx="1864473" cy="775543"/>
+          </a:xfrm>
+          <a:prstGeom prst="rect">
+            <a:avLst/>
+          </a:prstGeom>
+        </p:spPr>
+        <p:style>
+          <a:lnRef idx="2">
+            <a:schemeClr val="accent1">
+              <a:shade val="50000"/>
+            </a:schemeClr>
+          </a:lnRef>
+          <a:fillRef idx="1">
+            <a:schemeClr val="accent1"/>
+          </a:fillRef>
+          <a:effectRef idx="0">
+            <a:schemeClr val="accent1"/>
+          </a:effectRef>
+          <a:fontRef idx="minor">
+            <a:schemeClr val="lt1"/>
+          </a:fontRef>
+        </p:style>
+        <p:txBody>
+          <a:bodyPr rtlCol="0" anchor="ctr"/>
+          <a:lstStyle/>
+          <a:p>
+            <a:pPr algn="ctr"/>
+            <a:endParaRPr lang="en-US"/>
+          </a:p>
+        </p:txBody>
+      </p:sp>
+      <p:sp>
+        <p:nvSpPr>
+          <p:cNvPr id="21" name="Rectangle 20">
+            <a:extLst>
+              <a:ext uri="{FF2B5EF4-FFF2-40B4-BE49-F238E27FC236}">
+                <a16:creationId xmlns:a16="http://schemas.microsoft.com/office/drawing/2014/main" id="{B35EC25C-BDF7-49C6-AC04-582DDB1CFFA8}"/>
+              </a:ext>
+            </a:extLst>
+          </p:cNvPr>
+          <p:cNvSpPr/>
+          <p:nvPr/>
+        </p:nvSpPr>
+        <p:spPr>
+          <a:xfrm>
+            <a:off x="9658905" y="4820575"/>
+            <a:ext cx="1266291" cy="1932147"/>
+          </a:xfrm>
+          <a:prstGeom prst="rect">
+            <a:avLst/>
+          </a:prstGeom>
+        </p:spPr>
+        <p:style>
+          <a:lnRef idx="2">
+            <a:schemeClr val="accent1">
+              <a:shade val="50000"/>
+            </a:schemeClr>
+          </a:lnRef>
+          <a:fillRef idx="1">
+            <a:schemeClr val="accent1"/>
+          </a:fillRef>
+          <a:effectRef idx="0">
+            <a:schemeClr val="accent1"/>
+          </a:effectRef>
+          <a:fontRef idx="minor">
+            <a:schemeClr val="lt1"/>
+          </a:fontRef>
+        </p:style>
+        <p:txBody>
+          <a:bodyPr rtlCol="0" anchor="ctr"/>
+          <a:lstStyle/>
+          <a:p>
+            <a:pPr algn="ctr"/>
+            <a:endParaRPr lang="en-US"/>
+          </a:p>
+        </p:txBody>
+      </p:sp>
+      <p:sp>
+        <p:nvSpPr>
+          <p:cNvPr id="22" name="Rectangle 21">
+            <a:extLst>
+              <a:ext uri="{FF2B5EF4-FFF2-40B4-BE49-F238E27FC236}">
+                <a16:creationId xmlns:a16="http://schemas.microsoft.com/office/drawing/2014/main" id="{DEBDB219-0F9F-4428-A9B4-1A6E21009014}"/>
+              </a:ext>
+            </a:extLst>
+          </p:cNvPr>
+          <p:cNvSpPr/>
+          <p:nvPr/>
+        </p:nvSpPr>
+        <p:spPr>
+          <a:xfrm>
+            <a:off x="6672791" y="6110607"/>
+            <a:ext cx="2568864" cy="642115"/>
+          </a:xfrm>
+          <a:prstGeom prst="rect">
+            <a:avLst/>
+          </a:prstGeom>
+        </p:spPr>
+        <p:style>
+          <a:lnRef idx="2">
+            <a:schemeClr val="accent1">
+              <a:shade val="50000"/>
+            </a:schemeClr>
+          </a:lnRef>
+          <a:fillRef idx="1">
+            <a:schemeClr val="accent1"/>
+          </a:fillRef>
+          <a:effectRef idx="0">
+            <a:schemeClr val="accent1"/>
+          </a:effectRef>
+          <a:fontRef idx="minor">
+            <a:schemeClr val="lt1"/>
+          </a:fontRef>
+        </p:style>
+        <p:txBody>
+          <a:bodyPr rtlCol="0" anchor="ctr"/>
+          <a:lstStyle/>
+          <a:p>
+            <a:pPr algn="ctr"/>
+            <a:endParaRPr lang="en-US"/>
           </a:p>
         </p:txBody>
       </p:sp>
     </p:spTree>
     <p:extLst>
       <p:ext uri="{BB962C8B-B14F-4D97-AF65-F5344CB8AC3E}">
-        <p14:creationId xmlns:p14="http://schemas.microsoft.com/office/powerpoint/2010/main" val="3218559938"/>
+        <p14:creationId xmlns:p14="http://schemas.microsoft.com/office/powerpoint/2010/main" val="2230140587"/>
       </p:ext>
     </p:extLst>
   </p:cSld>
@@ -9711,6 +9754,86 @@
           <a:p>
             <a:r>
               <a:rPr lang="en-US" dirty="0"/>
+              <a:t>Schedule</a:t>
+            </a:r>
+          </a:p>
+        </p:txBody>
+      </p:sp>
+      <p:sp>
+        <p:nvSpPr>
+          <p:cNvPr id="3" name="Content Placeholder 2"/>
+          <p:cNvSpPr>
+            <a:spLocks noGrp="1"/>
+          </p:cNvSpPr>
+          <p:nvPr>
+            <p:ph idx="1"/>
+          </p:nvPr>
+        </p:nvSpPr>
+        <p:spPr/>
+        <p:txBody>
+          <a:bodyPr/>
+          <a:lstStyle/>
+          <a:p>
+            <a:r>
+              <a:rPr lang="en-US" dirty="0"/>
+              <a:t>Cutover to Trello</a:t>
+            </a:r>
+          </a:p>
+          <a:p>
+            <a:pPr marL="0" indent="0">
+              <a:buNone/>
+            </a:pPr>
+            <a:endParaRPr lang="en-US" dirty="0"/>
+          </a:p>
+        </p:txBody>
+      </p:sp>
+    </p:spTree>
+    <p:extLst>
+      <p:ext uri="{BB962C8B-B14F-4D97-AF65-F5344CB8AC3E}">
+        <p14:creationId xmlns:p14="http://schemas.microsoft.com/office/powerpoint/2010/main" val="3218559938"/>
+      </p:ext>
+    </p:extLst>
+  </p:cSld>
+  <p:clrMapOvr>
+    <a:masterClrMapping/>
+  </p:clrMapOvr>
+</p:sld>
+</file>
+
+<file path=ppt/slides/slide8.xml><?xml version="1.0" encoding="utf-8"?>
+<p:sld xmlns:a="http://schemas.openxmlformats.org/drawingml/2006/main" xmlns:r="http://schemas.openxmlformats.org/officeDocument/2006/relationships" xmlns:p="http://schemas.openxmlformats.org/presentationml/2006/main">
+  <p:cSld>
+    <p:spTree>
+      <p:nvGrpSpPr>
+        <p:cNvPr id="1" name=""/>
+        <p:cNvGrpSpPr/>
+        <p:nvPr/>
+      </p:nvGrpSpPr>
+      <p:grpSpPr>
+        <a:xfrm>
+          <a:off x="0" y="0"/>
+          <a:ext cx="0" cy="0"/>
+          <a:chOff x="0" y="0"/>
+          <a:chExt cx="0" cy="0"/>
+        </a:xfrm>
+      </p:grpSpPr>
+      <p:sp>
+        <p:nvSpPr>
+          <p:cNvPr id="2" name="Title 1"/>
+          <p:cNvSpPr>
+            <a:spLocks noGrp="1"/>
+          </p:cNvSpPr>
+          <p:nvPr>
+            <p:ph type="title"/>
+          </p:nvPr>
+        </p:nvSpPr>
+        <p:spPr/>
+        <p:txBody>
+          <a:bodyPr/>
+          <a:lstStyle/>
+          <a:p>
+            <a:r>
+              <a:rPr lang="en-US" dirty="0"/>
               <a:t>Roles</a:t>
             </a:r>
           </a:p>
@@ -9839,7 +9962,7 @@
 </p:sld>
 </file>
 
-<file path=ppt/slides/slide8.xml><?xml version="1.0" encoding="utf-8"?>
+<file path=ppt/slides/slide9.xml><?xml version="1.0" encoding="utf-8"?>
 <p:sld xmlns:a="http://schemas.openxmlformats.org/drawingml/2006/main" xmlns:r="http://schemas.openxmlformats.org/officeDocument/2006/relationships" xmlns:p="http://schemas.openxmlformats.org/presentationml/2006/main">
   <p:cSld>
     <p:spTree>

</xml_diff>